<commit_message>
to vid22 for RPS
</commit_message>
<xml_diff>
--- a/main/games/rock_paper_scissors/Rock Paper Scissors Documentation.pptx
+++ b/main/games/rock_paper_scissors/Rock Paper Scissors Documentation.pptx
@@ -5,7 +5,7 @@
     <p:sldMasterId id="2147483659" r:id="rId4"/>
   </p:sldMasterIdLst>
   <p:notesMasterIdLst>
-    <p:notesMasterId r:id="rId37"/>
+    <p:notesMasterId r:id="rId35"/>
   </p:notesMasterIdLst>
   <p:sldIdLst>
     <p:sldId id="256" r:id="rId5"/>
@@ -15,31 +15,29 @@
     <p:sldId id="290" r:id="rId9"/>
     <p:sldId id="291" r:id="rId10"/>
     <p:sldId id="259" r:id="rId11"/>
-    <p:sldId id="288" r:id="rId12"/>
-    <p:sldId id="262" r:id="rId13"/>
-    <p:sldId id="263" r:id="rId14"/>
-    <p:sldId id="261" r:id="rId15"/>
-    <p:sldId id="265" r:id="rId16"/>
-    <p:sldId id="264" r:id="rId17"/>
-    <p:sldId id="271" r:id="rId18"/>
-    <p:sldId id="272" r:id="rId19"/>
-    <p:sldId id="266" r:id="rId20"/>
-    <p:sldId id="270" r:id="rId21"/>
-    <p:sldId id="276" r:id="rId22"/>
-    <p:sldId id="273" r:id="rId23"/>
-    <p:sldId id="274" r:id="rId24"/>
-    <p:sldId id="275" r:id="rId25"/>
-    <p:sldId id="277" r:id="rId26"/>
-    <p:sldId id="278" r:id="rId27"/>
-    <p:sldId id="279" r:id="rId28"/>
-    <p:sldId id="280" r:id="rId29"/>
-    <p:sldId id="283" r:id="rId30"/>
-    <p:sldId id="282" r:id="rId31"/>
-    <p:sldId id="281" r:id="rId32"/>
-    <p:sldId id="284" r:id="rId33"/>
-    <p:sldId id="285" r:id="rId34"/>
-    <p:sldId id="286" r:id="rId35"/>
-    <p:sldId id="287" r:id="rId36"/>
+    <p:sldId id="262" r:id="rId12"/>
+    <p:sldId id="261" r:id="rId13"/>
+    <p:sldId id="265" r:id="rId14"/>
+    <p:sldId id="264" r:id="rId15"/>
+    <p:sldId id="271" r:id="rId16"/>
+    <p:sldId id="272" r:id="rId17"/>
+    <p:sldId id="266" r:id="rId18"/>
+    <p:sldId id="270" r:id="rId19"/>
+    <p:sldId id="276" r:id="rId20"/>
+    <p:sldId id="273" r:id="rId21"/>
+    <p:sldId id="274" r:id="rId22"/>
+    <p:sldId id="275" r:id="rId23"/>
+    <p:sldId id="277" r:id="rId24"/>
+    <p:sldId id="278" r:id="rId25"/>
+    <p:sldId id="279" r:id="rId26"/>
+    <p:sldId id="280" r:id="rId27"/>
+    <p:sldId id="283" r:id="rId28"/>
+    <p:sldId id="282" r:id="rId29"/>
+    <p:sldId id="281" r:id="rId30"/>
+    <p:sldId id="284" r:id="rId31"/>
+    <p:sldId id="285" r:id="rId32"/>
+    <p:sldId id="286" r:id="rId33"/>
+    <p:sldId id="287" r:id="rId34"/>
   </p:sldIdLst>
   <p:sldSz cx="9144000" cy="5143500" type="screen16x9"/>
   <p:notesSz cx="6858000" cy="9144000"/>
@@ -986,7 +984,7 @@
     </p:spTree>
     <p:extLst>
       <p:ext uri="{BB962C8B-B14F-4D97-AF65-F5344CB8AC3E}">
-        <p14:creationId xmlns:p14="http://schemas.microsoft.com/office/powerpoint/2010/main" val="2935618172"/>
+        <p14:creationId xmlns:p14="http://schemas.microsoft.com/office/powerpoint/2010/main" val="4124737771"/>
       </p:ext>
     </p:extLst>
   </p:cSld>
@@ -1095,7 +1093,7 @@
     </p:spTree>
     <p:extLst>
       <p:ext uri="{BB962C8B-B14F-4D97-AF65-F5344CB8AC3E}">
-        <p14:creationId xmlns:p14="http://schemas.microsoft.com/office/powerpoint/2010/main" val="4124737771"/>
+        <p14:creationId xmlns:p14="http://schemas.microsoft.com/office/powerpoint/2010/main" val="3579829201"/>
       </p:ext>
     </p:extLst>
   </p:cSld>
@@ -1204,7 +1202,7 @@
     </p:spTree>
     <p:extLst>
       <p:ext uri="{BB962C8B-B14F-4D97-AF65-F5344CB8AC3E}">
-        <p14:creationId xmlns:p14="http://schemas.microsoft.com/office/powerpoint/2010/main" val="3579829201"/>
+        <p14:creationId xmlns:p14="http://schemas.microsoft.com/office/powerpoint/2010/main" val="1233197778"/>
       </p:ext>
     </p:extLst>
   </p:cSld>
@@ -1313,7 +1311,7 @@
     </p:spTree>
     <p:extLst>
       <p:ext uri="{BB962C8B-B14F-4D97-AF65-F5344CB8AC3E}">
-        <p14:creationId xmlns:p14="http://schemas.microsoft.com/office/powerpoint/2010/main" val="1233197778"/>
+        <p14:creationId xmlns:p14="http://schemas.microsoft.com/office/powerpoint/2010/main" val="1854659955"/>
       </p:ext>
     </p:extLst>
   </p:cSld>
@@ -1422,7 +1420,7 @@
     </p:spTree>
     <p:extLst>
       <p:ext uri="{BB962C8B-B14F-4D97-AF65-F5344CB8AC3E}">
-        <p14:creationId xmlns:p14="http://schemas.microsoft.com/office/powerpoint/2010/main" val="1854659955"/>
+        <p14:creationId xmlns:p14="http://schemas.microsoft.com/office/powerpoint/2010/main" val="1567913487"/>
       </p:ext>
     </p:extLst>
   </p:cSld>
@@ -1531,7 +1529,7 @@
     </p:spTree>
     <p:extLst>
       <p:ext uri="{BB962C8B-B14F-4D97-AF65-F5344CB8AC3E}">
-        <p14:creationId xmlns:p14="http://schemas.microsoft.com/office/powerpoint/2010/main" val="1567913487"/>
+        <p14:creationId xmlns:p14="http://schemas.microsoft.com/office/powerpoint/2010/main" val="745779560"/>
       </p:ext>
     </p:extLst>
   </p:cSld>
@@ -1640,7 +1638,7 @@
     </p:spTree>
     <p:extLst>
       <p:ext uri="{BB962C8B-B14F-4D97-AF65-F5344CB8AC3E}">
-        <p14:creationId xmlns:p14="http://schemas.microsoft.com/office/powerpoint/2010/main" val="745779560"/>
+        <p14:creationId xmlns:p14="http://schemas.microsoft.com/office/powerpoint/2010/main" val="3926368428"/>
       </p:ext>
     </p:extLst>
   </p:cSld>
@@ -1749,7 +1747,7 @@
     </p:spTree>
     <p:extLst>
       <p:ext uri="{BB962C8B-B14F-4D97-AF65-F5344CB8AC3E}">
-        <p14:creationId xmlns:p14="http://schemas.microsoft.com/office/powerpoint/2010/main" val="3926368428"/>
+        <p14:creationId xmlns:p14="http://schemas.microsoft.com/office/powerpoint/2010/main" val="4036109500"/>
       </p:ext>
     </p:extLst>
   </p:cSld>
@@ -1858,7 +1856,7 @@
     </p:spTree>
     <p:extLst>
       <p:ext uri="{BB962C8B-B14F-4D97-AF65-F5344CB8AC3E}">
-        <p14:creationId xmlns:p14="http://schemas.microsoft.com/office/powerpoint/2010/main" val="4036109500"/>
+        <p14:creationId xmlns:p14="http://schemas.microsoft.com/office/powerpoint/2010/main" val="4056452143"/>
       </p:ext>
     </p:extLst>
   </p:cSld>
@@ -1967,7 +1965,7 @@
     </p:spTree>
     <p:extLst>
       <p:ext uri="{BB962C8B-B14F-4D97-AF65-F5344CB8AC3E}">
-        <p14:creationId xmlns:p14="http://schemas.microsoft.com/office/powerpoint/2010/main" val="4056452143"/>
+        <p14:creationId xmlns:p14="http://schemas.microsoft.com/office/powerpoint/2010/main" val="3531987235"/>
       </p:ext>
     </p:extLst>
   </p:cSld>
@@ -2201,7 +2199,7 @@
     </p:spTree>
     <p:extLst>
       <p:ext uri="{BB962C8B-B14F-4D97-AF65-F5344CB8AC3E}">
-        <p14:creationId xmlns:p14="http://schemas.microsoft.com/office/powerpoint/2010/main" val="3531987235"/>
+        <p14:creationId xmlns:p14="http://schemas.microsoft.com/office/powerpoint/2010/main" val="1284591829"/>
       </p:ext>
     </p:extLst>
   </p:cSld>
@@ -2310,7 +2308,7 @@
     </p:spTree>
     <p:extLst>
       <p:ext uri="{BB962C8B-B14F-4D97-AF65-F5344CB8AC3E}">
-        <p14:creationId xmlns:p14="http://schemas.microsoft.com/office/powerpoint/2010/main" val="1284591829"/>
+        <p14:creationId xmlns:p14="http://schemas.microsoft.com/office/powerpoint/2010/main" val="3354959135"/>
       </p:ext>
     </p:extLst>
   </p:cSld>
@@ -2419,7 +2417,7 @@
     </p:spTree>
     <p:extLst>
       <p:ext uri="{BB962C8B-B14F-4D97-AF65-F5344CB8AC3E}">
-        <p14:creationId xmlns:p14="http://schemas.microsoft.com/office/powerpoint/2010/main" val="3354959135"/>
+        <p14:creationId xmlns:p14="http://schemas.microsoft.com/office/powerpoint/2010/main" val="3864249418"/>
       </p:ext>
     </p:extLst>
   </p:cSld>
@@ -2528,7 +2526,7 @@
     </p:spTree>
     <p:extLst>
       <p:ext uri="{BB962C8B-B14F-4D97-AF65-F5344CB8AC3E}">
-        <p14:creationId xmlns:p14="http://schemas.microsoft.com/office/powerpoint/2010/main" val="3864249418"/>
+        <p14:creationId xmlns:p14="http://schemas.microsoft.com/office/powerpoint/2010/main" val="6615638"/>
       </p:ext>
     </p:extLst>
   </p:cSld>
@@ -2539,115 +2537,6 @@
 </file>
 
 <file path=ppt/notesSlides/notesSlide24.xml><?xml version="1.0" encoding="utf-8"?>
-<p:notes xmlns:a="http://schemas.openxmlformats.org/drawingml/2006/main" xmlns:r="http://schemas.openxmlformats.org/officeDocument/2006/relationships" xmlns:p="http://schemas.openxmlformats.org/presentationml/2006/main" showMasterSp="0" showMasterPhAnim="0">
-  <p:cSld>
-    <p:spTree>
-      <p:nvGrpSpPr>
-        <p:cNvPr id="1" name="Shape 80"/>
-        <p:cNvGrpSpPr/>
-        <p:nvPr/>
-      </p:nvGrpSpPr>
-      <p:grpSpPr>
-        <a:xfrm>
-          <a:off x="0" y="0"/>
-          <a:ext cx="0" cy="0"/>
-          <a:chOff x="0" y="0"/>
-          <a:chExt cx="0" cy="0"/>
-        </a:xfrm>
-      </p:grpSpPr>
-      <p:sp>
-        <p:nvSpPr>
-          <p:cNvPr id="81" name="Google Shape;81;ga2e8d2e1f6_0_75:notes"/>
-          <p:cNvSpPr>
-            <a:spLocks noGrp="1" noRot="1" noChangeAspect="1"/>
-          </p:cNvSpPr>
-          <p:nvPr>
-            <p:ph type="sldImg" idx="2"/>
-          </p:nvPr>
-        </p:nvSpPr>
-        <p:spPr>
-          <a:xfrm>
-            <a:off x="381000" y="685800"/>
-            <a:ext cx="6096000" cy="3429000"/>
-          </a:xfrm>
-          <a:custGeom>
-            <a:avLst/>
-            <a:gdLst/>
-            <a:ahLst/>
-            <a:cxnLst/>
-            <a:rect l="l" t="t" r="r" b="b"/>
-            <a:pathLst>
-              <a:path w="120000" h="120000" extrusionOk="0">
-                <a:moveTo>
-                  <a:pt x="0" y="0"/>
-                </a:moveTo>
-                <a:lnTo>
-                  <a:pt x="120000" y="0"/>
-                </a:lnTo>
-                <a:lnTo>
-                  <a:pt x="120000" y="120000"/>
-                </a:lnTo>
-                <a:lnTo>
-                  <a:pt x="0" y="120000"/>
-                </a:lnTo>
-                <a:close/>
-              </a:path>
-            </a:pathLst>
-          </a:custGeom>
-        </p:spPr>
-      </p:sp>
-      <p:sp>
-        <p:nvSpPr>
-          <p:cNvPr id="82" name="Google Shape;82;ga2e8d2e1f6_0_75:notes"/>
-          <p:cNvSpPr txBox="1">
-            <a:spLocks noGrp="1"/>
-          </p:cNvSpPr>
-          <p:nvPr>
-            <p:ph type="body" idx="1"/>
-          </p:nvPr>
-        </p:nvSpPr>
-        <p:spPr>
-          <a:xfrm>
-            <a:off x="685800" y="4343400"/>
-            <a:ext cx="5486400" cy="4114800"/>
-          </a:xfrm>
-          <a:prstGeom prst="rect">
-            <a:avLst/>
-          </a:prstGeom>
-        </p:spPr>
-        <p:txBody>
-          <a:bodyPr spcFirstLastPara="1" wrap="square" lIns="91425" tIns="91425" rIns="91425" bIns="91425" anchor="t" anchorCtr="0">
-            <a:noAutofit/>
-          </a:bodyPr>
-          <a:lstStyle/>
-          <a:p>
-            <a:pPr marL="0" lvl="0" indent="0" algn="l" rtl="0">
-              <a:spcBef>
-                <a:spcPts val="0"/>
-              </a:spcBef>
-              <a:spcAft>
-                <a:spcPts val="0"/>
-              </a:spcAft>
-              <a:buNone/>
-            </a:pPr>
-            <a:endParaRPr/>
-          </a:p>
-        </p:txBody>
-      </p:sp>
-    </p:spTree>
-    <p:extLst>
-      <p:ext uri="{BB962C8B-B14F-4D97-AF65-F5344CB8AC3E}">
-        <p14:creationId xmlns:p14="http://schemas.microsoft.com/office/powerpoint/2010/main" val="6615638"/>
-      </p:ext>
-    </p:extLst>
-  </p:cSld>
-  <p:clrMapOvr>
-    <a:masterClrMapping/>
-  </p:clrMapOvr>
-</p:notes>
-</file>
-
-<file path=ppt/notesSlides/notesSlide25.xml><?xml version="1.0" encoding="utf-8"?>
 <p:notes xmlns:a="http://schemas.openxmlformats.org/drawingml/2006/main" xmlns:r="http://schemas.openxmlformats.org/officeDocument/2006/relationships" xmlns:p="http://schemas.openxmlformats.org/presentationml/2006/main" showMasterSp="0" showMasterPhAnim="0">
   <p:cSld>
     <p:spTree>
@@ -2952,7 +2841,7 @@
               </a:spcAft>
               <a:buNone/>
             </a:pPr>
-            <a:endParaRPr/>
+            <a:endParaRPr dirty="0"/>
           </a:p>
         </p:txBody>
       </p:sp>
@@ -2969,7 +2858,7 @@
   <p:cSld>
     <p:spTree>
       <p:nvGrpSpPr>
-        <p:cNvPr id="1" name="Shape 74"/>
+        <p:cNvPr id="1" name="Shape 80"/>
         <p:cNvGrpSpPr/>
         <p:nvPr/>
       </p:nvGrpSpPr>
@@ -2983,7 +2872,7 @@
       </p:grpSpPr>
       <p:sp>
         <p:nvSpPr>
-          <p:cNvPr id="75" name="Google Shape;75;ga2e8d2e1f6_0_20:notes"/>
+          <p:cNvPr id="81" name="Google Shape;81;ga2e8d2e1f6_0_75:notes"/>
           <p:cNvSpPr>
             <a:spLocks noGrp="1" noRot="1" noChangeAspect="1"/>
           </p:cNvSpPr>
@@ -3024,7 +2913,7 @@
       </p:sp>
       <p:sp>
         <p:nvSpPr>
-          <p:cNvPr id="76" name="Google Shape;76;ga2e8d2e1f6_0_20:notes"/>
+          <p:cNvPr id="82" name="Google Shape;82;ga2e8d2e1f6_0_75:notes"/>
           <p:cNvSpPr txBox="1">
             <a:spLocks noGrp="1"/>
           </p:cNvSpPr>
@@ -3061,11 +2950,6 @@
         </p:txBody>
       </p:sp>
     </p:spTree>
-    <p:extLst>
-      <p:ext uri="{BB962C8B-B14F-4D97-AF65-F5344CB8AC3E}">
-        <p14:creationId xmlns:p14="http://schemas.microsoft.com/office/powerpoint/2010/main" val="2673306886"/>
-      </p:ext>
-    </p:extLst>
   </p:cSld>
   <p:clrMapOvr>
     <a:masterClrMapping/>
@@ -3170,6 +3054,11 @@
         </p:txBody>
       </p:sp>
     </p:spTree>
+    <p:extLst>
+      <p:ext uri="{BB962C8B-B14F-4D97-AF65-F5344CB8AC3E}">
+        <p14:creationId xmlns:p14="http://schemas.microsoft.com/office/powerpoint/2010/main" val="974409297"/>
+      </p:ext>
+    </p:extLst>
   </p:cSld>
   <p:clrMapOvr>
     <a:masterClrMapping/>
@@ -3276,7 +3165,7 @@
     </p:spTree>
     <p:extLst>
       <p:ext uri="{BB962C8B-B14F-4D97-AF65-F5344CB8AC3E}">
-        <p14:creationId xmlns:p14="http://schemas.microsoft.com/office/powerpoint/2010/main" val="974409297"/>
+        <p14:creationId xmlns:p14="http://schemas.microsoft.com/office/powerpoint/2010/main" val="801243526"/>
       </p:ext>
     </p:extLst>
   </p:cSld>
@@ -3385,7 +3274,7 @@
     </p:spTree>
     <p:extLst>
       <p:ext uri="{BB962C8B-B14F-4D97-AF65-F5344CB8AC3E}">
-        <p14:creationId xmlns:p14="http://schemas.microsoft.com/office/powerpoint/2010/main" val="801243526"/>
+        <p14:creationId xmlns:p14="http://schemas.microsoft.com/office/powerpoint/2010/main" val="4134617096"/>
       </p:ext>
     </p:extLst>
   </p:cSld>
@@ -3494,7 +3383,7 @@
     </p:spTree>
     <p:extLst>
       <p:ext uri="{BB962C8B-B14F-4D97-AF65-F5344CB8AC3E}">
-        <p14:creationId xmlns:p14="http://schemas.microsoft.com/office/powerpoint/2010/main" val="4134617096"/>
+        <p14:creationId xmlns:p14="http://schemas.microsoft.com/office/powerpoint/2010/main" val="2935618172"/>
       </p:ext>
     </p:extLst>
   </p:cSld>
@@ -8563,286 +8452,6 @@
   <p:cSld>
     <p:spTree>
       <p:nvGrpSpPr>
-        <p:cNvPr id="1" name=""/>
-        <p:cNvGrpSpPr/>
-        <p:nvPr/>
-      </p:nvGrpSpPr>
-      <p:grpSpPr>
-        <a:xfrm>
-          <a:off x="0" y="0"/>
-          <a:ext cx="0" cy="0"/>
-          <a:chOff x="0" y="0"/>
-          <a:chExt cx="0" cy="0"/>
-        </a:xfrm>
-      </p:grpSpPr>
-      <p:sp>
-        <p:nvSpPr>
-          <p:cNvPr id="2" name="Title 1">
-            <a:extLst>
-              <a:ext uri="{FF2B5EF4-FFF2-40B4-BE49-F238E27FC236}">
-                <a16:creationId xmlns:a16="http://schemas.microsoft.com/office/drawing/2014/main" id="{530D5B42-7055-4623-A2AE-E820E726C281}"/>
-              </a:ext>
-            </a:extLst>
-          </p:cNvPr>
-          <p:cNvSpPr>
-            <a:spLocks noGrp="1"/>
-          </p:cNvSpPr>
-          <p:nvPr>
-            <p:ph type="title"/>
-          </p:nvPr>
-        </p:nvSpPr>
-        <p:spPr/>
-        <p:txBody>
-          <a:bodyPr/>
-          <a:lstStyle/>
-          <a:p>
-            <a:r>
-              <a:rPr lang="en-US" b="1" dirty="0"/>
-              <a:t>Yes / No Checker Testing</a:t>
-            </a:r>
-            <a:endParaRPr lang="en-NZ" b="1" dirty="0"/>
-          </a:p>
-        </p:txBody>
-      </p:sp>
-      <p:pic>
-        <p:nvPicPr>
-          <p:cNvPr id="3" name="Picture 2">
-            <a:extLst>
-              <a:ext uri="{FF2B5EF4-FFF2-40B4-BE49-F238E27FC236}">
-                <a16:creationId xmlns:a16="http://schemas.microsoft.com/office/drawing/2014/main" id="{EF9BDCB2-D62E-4280-B512-E2F3B331180F}"/>
-              </a:ext>
-            </a:extLst>
-          </p:cNvPr>
-          <p:cNvPicPr>
-            <a:picLocks noChangeAspect="1"/>
-          </p:cNvPicPr>
-          <p:nvPr/>
-        </p:nvPicPr>
-        <p:blipFill>
-          <a:blip r:embed="rId2"/>
-          <a:stretch>
-            <a:fillRect/>
-          </a:stretch>
-        </p:blipFill>
-        <p:spPr>
-          <a:xfrm>
-            <a:off x="3518451" y="1474680"/>
-            <a:ext cx="4055188" cy="2355197"/>
-          </a:xfrm>
-          <a:prstGeom prst="rect">
-            <a:avLst/>
-          </a:prstGeom>
-        </p:spPr>
-      </p:pic>
-      <p:sp>
-        <p:nvSpPr>
-          <p:cNvPr id="6" name="Rectangle 5">
-            <a:extLst>
-              <a:ext uri="{FF2B5EF4-FFF2-40B4-BE49-F238E27FC236}">
-                <a16:creationId xmlns:a16="http://schemas.microsoft.com/office/drawing/2014/main" id="{4B07E0F8-BB7C-444A-BA05-88CEC5880AA6}"/>
-              </a:ext>
-            </a:extLst>
-          </p:cNvPr>
-          <p:cNvSpPr/>
-          <p:nvPr/>
-        </p:nvSpPr>
-        <p:spPr>
-          <a:xfrm>
-            <a:off x="954156" y="1481759"/>
-            <a:ext cx="1704548" cy="2179982"/>
-          </a:xfrm>
-          <a:prstGeom prst="rect">
-            <a:avLst/>
-          </a:prstGeom>
-        </p:spPr>
-        <p:style>
-          <a:lnRef idx="2">
-            <a:schemeClr val="accent1">
-              <a:shade val="50000"/>
-            </a:schemeClr>
-          </a:lnRef>
-          <a:fillRef idx="1">
-            <a:schemeClr val="accent1"/>
-          </a:fillRef>
-          <a:effectRef idx="0">
-            <a:schemeClr val="accent1"/>
-          </a:effectRef>
-          <a:fontRef idx="minor">
-            <a:schemeClr val="lt1"/>
-          </a:fontRef>
-        </p:style>
-        <p:txBody>
-          <a:bodyPr rtlCol="0" anchor="ctr"/>
-          <a:lstStyle/>
-          <a:p>
-            <a:r>
-              <a:rPr lang="en-NZ"/>
-              <a:t>All cases worked as expected (code has been looped to make testing easier)</a:t>
-            </a:r>
-            <a:endParaRPr lang="en-NZ" dirty="0"/>
-          </a:p>
-        </p:txBody>
-      </p:sp>
-    </p:spTree>
-    <p:extLst>
-      <p:ext uri="{BB962C8B-B14F-4D97-AF65-F5344CB8AC3E}">
-        <p14:creationId xmlns:p14="http://schemas.microsoft.com/office/powerpoint/2010/main" val="3716461137"/>
-      </p:ext>
-    </p:extLst>
-  </p:cSld>
-  <p:clrMapOvr>
-    <a:masterClrMapping/>
-  </p:clrMapOvr>
-</p:sld>
-</file>
-
-<file path=ppt/slides/slide11.xml><?xml version="1.0" encoding="utf-8"?>
-<p:sld xmlns:a="http://schemas.openxmlformats.org/drawingml/2006/main" xmlns:r="http://schemas.openxmlformats.org/officeDocument/2006/relationships" xmlns:p="http://schemas.openxmlformats.org/presentationml/2006/main">
-  <p:cSld>
-    <p:bg>
-      <p:bgPr>
-        <a:solidFill>
-          <a:srgbClr val="FFD966"/>
-        </a:solidFill>
-        <a:effectLst/>
-      </p:bgPr>
-    </p:bg>
-    <p:spTree>
-      <p:nvGrpSpPr>
-        <p:cNvPr id="1" name="Shape 83"/>
-        <p:cNvGrpSpPr/>
-        <p:nvPr/>
-      </p:nvGrpSpPr>
-      <p:grpSpPr>
-        <a:xfrm>
-          <a:off x="0" y="0"/>
-          <a:ext cx="0" cy="0"/>
-          <a:chOff x="0" y="0"/>
-          <a:chExt cx="0" cy="0"/>
-        </a:xfrm>
-      </p:grpSpPr>
-      <p:sp>
-        <p:nvSpPr>
-          <p:cNvPr id="84" name="Google Shape;84;p18"/>
-          <p:cNvSpPr txBox="1">
-            <a:spLocks noGrp="1"/>
-          </p:cNvSpPr>
-          <p:nvPr>
-            <p:ph type="title"/>
-          </p:nvPr>
-        </p:nvSpPr>
-        <p:spPr>
-          <a:xfrm>
-            <a:off x="311700" y="445025"/>
-            <a:ext cx="8520600" cy="572700"/>
-          </a:xfrm>
-          <a:prstGeom prst="rect">
-            <a:avLst/>
-          </a:prstGeom>
-        </p:spPr>
-        <p:txBody>
-          <a:bodyPr spcFirstLastPara="1" wrap="square" lIns="91425" tIns="91425" rIns="91425" bIns="91425" anchor="t" anchorCtr="0">
-            <a:noAutofit/>
-          </a:bodyPr>
-          <a:lstStyle/>
-          <a:p>
-            <a:pPr marL="0" lvl="0" indent="0" algn="l" rtl="0">
-              <a:spcBef>
-                <a:spcPts val="0"/>
-              </a:spcBef>
-              <a:spcAft>
-                <a:spcPts val="0"/>
-              </a:spcAft>
-              <a:buNone/>
-            </a:pPr>
-            <a:r>
-              <a:rPr lang="en-NZ" b="1" dirty="0"/>
-              <a:t>Yes / No trialling</a:t>
-            </a:r>
-            <a:endParaRPr b="1" dirty="0"/>
-          </a:p>
-        </p:txBody>
-      </p:sp>
-      <p:sp>
-        <p:nvSpPr>
-          <p:cNvPr id="85" name="Google Shape;85;p18"/>
-          <p:cNvSpPr txBox="1">
-            <a:spLocks noGrp="1"/>
-          </p:cNvSpPr>
-          <p:nvPr>
-            <p:ph type="body" idx="1"/>
-          </p:nvPr>
-        </p:nvSpPr>
-        <p:spPr>
-          <a:xfrm>
-            <a:off x="311700" y="1152475"/>
-            <a:ext cx="8520600" cy="3416400"/>
-          </a:xfrm>
-          <a:prstGeom prst="rect">
-            <a:avLst/>
-          </a:prstGeom>
-        </p:spPr>
-        <p:txBody>
-          <a:bodyPr spcFirstLastPara="1" wrap="square" lIns="91425" tIns="91425" rIns="91425" bIns="91425" anchor="t" anchorCtr="0">
-            <a:noAutofit/>
-          </a:bodyPr>
-          <a:lstStyle/>
-          <a:p>
-            <a:pPr marL="0" lvl="0" indent="0" algn="l" rtl="0">
-              <a:spcBef>
-                <a:spcPts val="0"/>
-              </a:spcBef>
-              <a:spcAft>
-                <a:spcPts val="1600"/>
-              </a:spcAft>
-              <a:buNone/>
-            </a:pPr>
-            <a:r>
-              <a:rPr lang="en" i="1" dirty="0"/>
-              <a:t>Intial Trial: The code worked for yes / no but failed if UPPERCASE characters were used.</a:t>
-            </a:r>
-            <a:br>
-              <a:rPr lang="en" i="1" dirty="0"/>
-            </a:br>
-            <a:r>
-              <a:rPr lang="en" i="1" dirty="0"/>
-              <a:t>Trial 1 (01_yes_no_v1.py): This piece of code worked for both UPPER and lower case characters but was ineffecient. It has five if / elif / else statements and quite a bit of repeated code. </a:t>
-            </a:r>
-            <a:br>
-              <a:rPr lang="en" i="1" dirty="0"/>
-            </a:br>
-            <a:r>
-              <a:rPr lang="en" i="1" dirty="0"/>
-              <a:t>Trial 2 (01_yes_no_v2): I used the ‘or’ command</a:t>
-            </a:r>
-            <a:r>
-              <a:rPr lang="en-NZ" i="1" dirty="0"/>
-              <a:t> to combine my ‘yes’ / ‘y’ statements and this code is more efficient compared with trial #1. </a:t>
-            </a:r>
-            <a:br>
-              <a:rPr lang="en-NZ" i="1" dirty="0"/>
-            </a:br>
-            <a:r>
-              <a:rPr lang="en-NZ" i="1" dirty="0"/>
-              <a:t>Trial 3 (02_yes_no_v1.py): I made the code from trial 3 into a function which makes it easy to ask more than one yes / no question in a program. I will use this function in my Lucky Unicorn outcome. </a:t>
-            </a:r>
-            <a:endParaRPr i="1" dirty="0"/>
-          </a:p>
-        </p:txBody>
-      </p:sp>
-    </p:spTree>
-  </p:cSld>
-  <p:clrMapOvr>
-    <a:masterClrMapping/>
-  </p:clrMapOvr>
-</p:sld>
-</file>
-
-<file path=ppt/slides/slide12.xml><?xml version="1.0" encoding="utf-8"?>
-<p:sld xmlns:a="http://schemas.openxmlformats.org/drawingml/2006/main" xmlns:r="http://schemas.openxmlformats.org/officeDocument/2006/relationships" xmlns:p="http://schemas.openxmlformats.org/presentationml/2006/main">
-  <p:cSld>
-    <p:spTree>
-      <p:nvGrpSpPr>
         <p:cNvPr id="1" name="Shape 83"/>
         <p:cNvGrpSpPr/>
         <p:nvPr/>
@@ -9080,7 +8689,7 @@
 </p:sld>
 </file>
 
-<file path=ppt/slides/slide13.xml><?xml version="1.0" encoding="utf-8"?>
+<file path=ppt/slides/slide11.xml><?xml version="1.0" encoding="utf-8"?>
 <p:sld xmlns:a="http://schemas.openxmlformats.org/drawingml/2006/main" xmlns:r="http://schemas.openxmlformats.org/officeDocument/2006/relationships" xmlns:p="http://schemas.openxmlformats.org/presentationml/2006/main">
   <p:cSld>
     <p:spTree>
@@ -9224,7 +8833,7 @@
 </p:sld>
 </file>
 
-<file path=ppt/slides/slide14.xml><?xml version="1.0" encoding="utf-8"?>
+<file path=ppt/slides/slide12.xml><?xml version="1.0" encoding="utf-8"?>
 <p:sld xmlns:a="http://schemas.openxmlformats.org/drawingml/2006/main" xmlns:r="http://schemas.openxmlformats.org/officeDocument/2006/relationships" xmlns:p="http://schemas.openxmlformats.org/presentationml/2006/main">
   <p:cSld>
     <p:spTree>
@@ -9313,7 +8922,7 @@
 </p:sld>
 </file>
 
-<file path=ppt/slides/slide15.xml><?xml version="1.0" encoding="utf-8"?>
+<file path=ppt/slides/slide13.xml><?xml version="1.0" encoding="utf-8"?>
 <p:sld xmlns:a="http://schemas.openxmlformats.org/drawingml/2006/main" xmlns:r="http://schemas.openxmlformats.org/officeDocument/2006/relationships" xmlns:p="http://schemas.openxmlformats.org/presentationml/2006/main">
   <p:cSld>
     <p:spTree>
@@ -9450,7 +9059,7 @@
 </p:sld>
 </file>
 
-<file path=ppt/slides/slide16.xml><?xml version="1.0" encoding="utf-8"?>
+<file path=ppt/slides/slide14.xml><?xml version="1.0" encoding="utf-8"?>
 <p:sld xmlns:a="http://schemas.openxmlformats.org/drawingml/2006/main" xmlns:r="http://schemas.openxmlformats.org/officeDocument/2006/relationships" xmlns:p="http://schemas.openxmlformats.org/presentationml/2006/main">
   <p:cSld>
     <p:spTree>
@@ -9658,7 +9267,7 @@
 </p:sld>
 </file>
 
-<file path=ppt/slides/slide17.xml><?xml version="1.0" encoding="utf-8"?>
+<file path=ppt/slides/slide15.xml><?xml version="1.0" encoding="utf-8"?>
 <p:sld xmlns:a="http://schemas.openxmlformats.org/drawingml/2006/main" xmlns:r="http://schemas.openxmlformats.org/officeDocument/2006/relationships" xmlns:p="http://schemas.openxmlformats.org/presentationml/2006/main">
   <p:cSld>
     <p:spTree>
@@ -9982,7 +9591,7 @@
 </p:sld>
 </file>
 
-<file path=ppt/slides/slide18.xml><?xml version="1.0" encoding="utf-8"?>
+<file path=ppt/slides/slide16.xml><?xml version="1.0" encoding="utf-8"?>
 <p:sld xmlns:a="http://schemas.openxmlformats.org/drawingml/2006/main" xmlns:r="http://schemas.openxmlformats.org/officeDocument/2006/relationships" xmlns:p="http://schemas.openxmlformats.org/presentationml/2006/main">
   <p:cSld>
     <p:spTree>
@@ -10498,7 +10107,7 @@
 </p:sld>
 </file>
 
-<file path=ppt/slides/slide19.xml><?xml version="1.0" encoding="utf-8"?>
+<file path=ppt/slides/slide17.xml><?xml version="1.0" encoding="utf-8"?>
 <p:sld xmlns:a="http://schemas.openxmlformats.org/drawingml/2006/main" xmlns:r="http://schemas.openxmlformats.org/officeDocument/2006/relationships" xmlns:p="http://schemas.openxmlformats.org/presentationml/2006/main">
   <p:cSld>
     <p:spTree>
@@ -10679,112 +10288,7 @@
 </p:sld>
 </file>
 
-<file path=ppt/slides/slide2.xml><?xml version="1.0" encoding="utf-8"?>
-<p:sld xmlns:a="http://schemas.openxmlformats.org/drawingml/2006/main" xmlns:r="http://schemas.openxmlformats.org/officeDocument/2006/relationships" xmlns:p="http://schemas.openxmlformats.org/presentationml/2006/main">
-  <p:cSld>
-    <p:bg>
-      <p:bgPr>
-        <a:solidFill>
-          <a:srgbClr val="D9EAD3"/>
-        </a:solidFill>
-        <a:effectLst/>
-      </p:bgPr>
-    </p:bg>
-    <p:spTree>
-      <p:nvGrpSpPr>
-        <p:cNvPr id="1" name="Shape 66"/>
-        <p:cNvGrpSpPr/>
-        <p:nvPr/>
-      </p:nvGrpSpPr>
-      <p:grpSpPr>
-        <a:xfrm>
-          <a:off x="0" y="0"/>
-          <a:ext cx="0" cy="0"/>
-          <a:chOff x="0" y="0"/>
-          <a:chExt cx="0" cy="0"/>
-        </a:xfrm>
-      </p:grpSpPr>
-      <p:sp>
-        <p:nvSpPr>
-          <p:cNvPr id="67" name="Google Shape;67;p15"/>
-          <p:cNvSpPr txBox="1">
-            <a:spLocks noGrp="1"/>
-          </p:cNvSpPr>
-          <p:nvPr>
-            <p:ph type="title"/>
-          </p:nvPr>
-        </p:nvSpPr>
-        <p:spPr>
-          <a:xfrm>
-            <a:off x="311700" y="445025"/>
-            <a:ext cx="8520600" cy="572700"/>
-          </a:xfrm>
-          <a:prstGeom prst="rect">
-            <a:avLst/>
-          </a:prstGeom>
-        </p:spPr>
-        <p:txBody>
-          <a:bodyPr spcFirstLastPara="1" wrap="square" lIns="91425" tIns="91425" rIns="91425" bIns="91425" anchor="t" anchorCtr="0">
-            <a:noAutofit/>
-          </a:bodyPr>
-          <a:lstStyle/>
-          <a:p>
-            <a:pPr marL="0" lvl="0" indent="0" algn="l" rtl="0">
-              <a:spcBef>
-                <a:spcPts val="0"/>
-              </a:spcBef>
-              <a:spcAft>
-                <a:spcPts val="0"/>
-              </a:spcAft>
-              <a:buNone/>
-            </a:pPr>
-            <a:r>
-              <a:rPr lang="en" b="1" dirty="0"/>
-              <a:t>Decomposition</a:t>
-            </a:r>
-            <a:endParaRPr b="1" dirty="0"/>
-          </a:p>
-        </p:txBody>
-      </p:sp>
-      <p:pic>
-        <p:nvPicPr>
-          <p:cNvPr id="2" name="Picture 1">
-            <a:extLst>
-              <a:ext uri="{FF2B5EF4-FFF2-40B4-BE49-F238E27FC236}">
-                <a16:creationId xmlns:a16="http://schemas.microsoft.com/office/drawing/2014/main" id="{B89EF260-77D9-4233-8AB5-57CEACD591F9}"/>
-              </a:ext>
-            </a:extLst>
-          </p:cNvPr>
-          <p:cNvPicPr>
-            <a:picLocks noChangeAspect="1"/>
-          </p:cNvPicPr>
-          <p:nvPr/>
-        </p:nvPicPr>
-        <p:blipFill>
-          <a:blip r:embed="rId3"/>
-          <a:stretch>
-            <a:fillRect/>
-          </a:stretch>
-        </p:blipFill>
-        <p:spPr>
-          <a:xfrm>
-            <a:off x="514779" y="1144283"/>
-            <a:ext cx="2052421" cy="3554192"/>
-          </a:xfrm>
-          <a:prstGeom prst="rect">
-            <a:avLst/>
-          </a:prstGeom>
-        </p:spPr>
-      </p:pic>
-    </p:spTree>
-  </p:cSld>
-  <p:clrMapOvr>
-    <a:masterClrMapping/>
-  </p:clrMapOvr>
-</p:sld>
-</file>
-
-<file path=ppt/slides/slide20.xml><?xml version="1.0" encoding="utf-8"?>
+<file path=ppt/slides/slide18.xml><?xml version="1.0" encoding="utf-8"?>
 <p:sld xmlns:a="http://schemas.openxmlformats.org/drawingml/2006/main" xmlns:r="http://schemas.openxmlformats.org/officeDocument/2006/relationships" xmlns:p="http://schemas.openxmlformats.org/presentationml/2006/main">
   <p:cSld>
     <p:spTree>
@@ -10932,7 +10436,7 @@
 </p:sld>
 </file>
 
-<file path=ppt/slides/slide21.xml><?xml version="1.0" encoding="utf-8"?>
+<file path=ppt/slides/slide19.xml><?xml version="1.0" encoding="utf-8"?>
 <p:sld xmlns:a="http://schemas.openxmlformats.org/drawingml/2006/main" xmlns:r="http://schemas.openxmlformats.org/officeDocument/2006/relationships" xmlns:p="http://schemas.openxmlformats.org/presentationml/2006/main">
   <p:cSld>
     <p:spTree>
@@ -11207,7 +10711,112 @@
 </p:sld>
 </file>
 
-<file path=ppt/slides/slide22.xml><?xml version="1.0" encoding="utf-8"?>
+<file path=ppt/slides/slide2.xml><?xml version="1.0" encoding="utf-8"?>
+<p:sld xmlns:a="http://schemas.openxmlformats.org/drawingml/2006/main" xmlns:r="http://schemas.openxmlformats.org/officeDocument/2006/relationships" xmlns:p="http://schemas.openxmlformats.org/presentationml/2006/main">
+  <p:cSld>
+    <p:bg>
+      <p:bgPr>
+        <a:solidFill>
+          <a:srgbClr val="D9EAD3"/>
+        </a:solidFill>
+        <a:effectLst/>
+      </p:bgPr>
+    </p:bg>
+    <p:spTree>
+      <p:nvGrpSpPr>
+        <p:cNvPr id="1" name="Shape 66"/>
+        <p:cNvGrpSpPr/>
+        <p:nvPr/>
+      </p:nvGrpSpPr>
+      <p:grpSpPr>
+        <a:xfrm>
+          <a:off x="0" y="0"/>
+          <a:ext cx="0" cy="0"/>
+          <a:chOff x="0" y="0"/>
+          <a:chExt cx="0" cy="0"/>
+        </a:xfrm>
+      </p:grpSpPr>
+      <p:sp>
+        <p:nvSpPr>
+          <p:cNvPr id="67" name="Google Shape;67;p15"/>
+          <p:cNvSpPr txBox="1">
+            <a:spLocks noGrp="1"/>
+          </p:cNvSpPr>
+          <p:nvPr>
+            <p:ph type="title"/>
+          </p:nvPr>
+        </p:nvSpPr>
+        <p:spPr>
+          <a:xfrm>
+            <a:off x="311700" y="445025"/>
+            <a:ext cx="8520600" cy="572700"/>
+          </a:xfrm>
+          <a:prstGeom prst="rect">
+            <a:avLst/>
+          </a:prstGeom>
+        </p:spPr>
+        <p:txBody>
+          <a:bodyPr spcFirstLastPara="1" wrap="square" lIns="91425" tIns="91425" rIns="91425" bIns="91425" anchor="t" anchorCtr="0">
+            <a:noAutofit/>
+          </a:bodyPr>
+          <a:lstStyle/>
+          <a:p>
+            <a:pPr marL="0" lvl="0" indent="0" algn="l" rtl="0">
+              <a:spcBef>
+                <a:spcPts val="0"/>
+              </a:spcBef>
+              <a:spcAft>
+                <a:spcPts val="0"/>
+              </a:spcAft>
+              <a:buNone/>
+            </a:pPr>
+            <a:r>
+              <a:rPr lang="en" b="1" dirty="0"/>
+              <a:t>Decomposition</a:t>
+            </a:r>
+            <a:endParaRPr b="1" dirty="0"/>
+          </a:p>
+        </p:txBody>
+      </p:sp>
+      <p:pic>
+        <p:nvPicPr>
+          <p:cNvPr id="2" name="Picture 1">
+            <a:extLst>
+              <a:ext uri="{FF2B5EF4-FFF2-40B4-BE49-F238E27FC236}">
+                <a16:creationId xmlns:a16="http://schemas.microsoft.com/office/drawing/2014/main" id="{B89EF260-77D9-4233-8AB5-57CEACD591F9}"/>
+              </a:ext>
+            </a:extLst>
+          </p:cNvPr>
+          <p:cNvPicPr>
+            <a:picLocks noChangeAspect="1"/>
+          </p:cNvPicPr>
+          <p:nvPr/>
+        </p:nvPicPr>
+        <p:blipFill>
+          <a:blip r:embed="rId3"/>
+          <a:stretch>
+            <a:fillRect/>
+          </a:stretch>
+        </p:blipFill>
+        <p:spPr>
+          <a:xfrm>
+            <a:off x="514779" y="1144283"/>
+            <a:ext cx="2052421" cy="3554192"/>
+          </a:xfrm>
+          <a:prstGeom prst="rect">
+            <a:avLst/>
+          </a:prstGeom>
+        </p:spPr>
+      </p:pic>
+    </p:spTree>
+  </p:cSld>
+  <p:clrMapOvr>
+    <a:masterClrMapping/>
+  </p:clrMapOvr>
+</p:sld>
+</file>
+
+<file path=ppt/slides/slide20.xml><?xml version="1.0" encoding="utf-8"?>
 <p:sld xmlns:a="http://schemas.openxmlformats.org/drawingml/2006/main" xmlns:r="http://schemas.openxmlformats.org/officeDocument/2006/relationships" xmlns:p="http://schemas.openxmlformats.org/presentationml/2006/main">
   <p:cSld>
     <p:spTree>
@@ -11451,7 +11060,7 @@
 </p:sld>
 </file>
 
-<file path=ppt/slides/slide23.xml><?xml version="1.0" encoding="utf-8"?>
+<file path=ppt/slides/slide21.xml><?xml version="1.0" encoding="utf-8"?>
 <p:sld xmlns:a="http://schemas.openxmlformats.org/drawingml/2006/main" xmlns:r="http://schemas.openxmlformats.org/officeDocument/2006/relationships" xmlns:p="http://schemas.openxmlformats.org/presentationml/2006/main">
   <p:cSld>
     <p:spTree>
@@ -11602,7 +11211,7 @@
 </p:sld>
 </file>
 
-<file path=ppt/slides/slide24.xml><?xml version="1.0" encoding="utf-8"?>
+<file path=ppt/slides/slide22.xml><?xml version="1.0" encoding="utf-8"?>
 <p:sld xmlns:a="http://schemas.openxmlformats.org/drawingml/2006/main" xmlns:r="http://schemas.openxmlformats.org/officeDocument/2006/relationships" xmlns:p="http://schemas.openxmlformats.org/presentationml/2006/main">
   <p:cSld>
     <p:spTree>
@@ -11852,7 +11461,7 @@
 </p:sld>
 </file>
 
-<file path=ppt/slides/slide25.xml><?xml version="1.0" encoding="utf-8"?>
+<file path=ppt/slides/slide23.xml><?xml version="1.0" encoding="utf-8"?>
 <p:sld xmlns:a="http://schemas.openxmlformats.org/drawingml/2006/main" xmlns:r="http://schemas.openxmlformats.org/officeDocument/2006/relationships" xmlns:p="http://schemas.openxmlformats.org/presentationml/2006/main">
   <p:cSld>
     <p:spTree>
@@ -12120,7 +11729,7 @@
 </p:sld>
 </file>
 
-<file path=ppt/slides/slide26.xml><?xml version="1.0" encoding="utf-8"?>
+<file path=ppt/slides/slide24.xml><?xml version="1.0" encoding="utf-8"?>
 <p:sld xmlns:a="http://schemas.openxmlformats.org/drawingml/2006/main" xmlns:r="http://schemas.openxmlformats.org/officeDocument/2006/relationships" xmlns:p="http://schemas.openxmlformats.org/presentationml/2006/main">
   <p:cSld>
     <p:spTree>
@@ -12373,7 +11982,7 @@
 </p:sld>
 </file>
 
-<file path=ppt/slides/slide27.xml><?xml version="1.0" encoding="utf-8"?>
+<file path=ppt/slides/slide25.xml><?xml version="1.0" encoding="utf-8"?>
 <p:sld xmlns:a="http://schemas.openxmlformats.org/drawingml/2006/main" xmlns:r="http://schemas.openxmlformats.org/officeDocument/2006/relationships" xmlns:p="http://schemas.openxmlformats.org/presentationml/2006/main">
   <p:cSld>
     <p:spTree>
@@ -12505,7 +12114,7 @@
 </p:sld>
 </file>
 
-<file path=ppt/slides/slide28.xml><?xml version="1.0" encoding="utf-8"?>
+<file path=ppt/slides/slide26.xml><?xml version="1.0" encoding="utf-8"?>
 <p:sld xmlns:a="http://schemas.openxmlformats.org/drawingml/2006/main" xmlns:r="http://schemas.openxmlformats.org/officeDocument/2006/relationships" xmlns:p="http://schemas.openxmlformats.org/presentationml/2006/main">
   <p:cSld>
     <p:spTree>
@@ -12637,7 +12246,7 @@
 </p:sld>
 </file>
 
-<file path=ppt/slides/slide29.xml><?xml version="1.0" encoding="utf-8"?>
+<file path=ppt/slides/slide27.xml><?xml version="1.0" encoding="utf-8"?>
 <p:sld xmlns:a="http://schemas.openxmlformats.org/drawingml/2006/main" xmlns:r="http://schemas.openxmlformats.org/officeDocument/2006/relationships" xmlns:p="http://schemas.openxmlformats.org/presentationml/2006/main">
   <p:cSld>
     <p:spTree>
@@ -12760,6 +12369,263 @@
     <p:extLst>
       <p:ext uri="{BB962C8B-B14F-4D97-AF65-F5344CB8AC3E}">
         <p14:creationId xmlns:p14="http://schemas.microsoft.com/office/powerpoint/2010/main" val="3630987550"/>
+      </p:ext>
+    </p:extLst>
+  </p:cSld>
+  <p:clrMapOvr>
+    <a:masterClrMapping/>
+  </p:clrMapOvr>
+</p:sld>
+</file>
+
+<file path=ppt/slides/slide28.xml><?xml version="1.0" encoding="utf-8"?>
+<p:sld xmlns:a="http://schemas.openxmlformats.org/drawingml/2006/main" xmlns:r="http://schemas.openxmlformats.org/officeDocument/2006/relationships" xmlns:p="http://schemas.openxmlformats.org/presentationml/2006/main">
+  <p:cSld>
+    <p:spTree>
+      <p:nvGrpSpPr>
+        <p:cNvPr id="1" name="Shape 83"/>
+        <p:cNvGrpSpPr/>
+        <p:nvPr/>
+      </p:nvGrpSpPr>
+      <p:grpSpPr>
+        <a:xfrm>
+          <a:off x="0" y="0"/>
+          <a:ext cx="0" cy="0"/>
+          <a:chOff x="0" y="0"/>
+          <a:chExt cx="0" cy="0"/>
+        </a:xfrm>
+      </p:grpSpPr>
+      <p:sp>
+        <p:nvSpPr>
+          <p:cNvPr id="84" name="Google Shape;84;p18"/>
+          <p:cNvSpPr txBox="1">
+            <a:spLocks noGrp="1"/>
+          </p:cNvSpPr>
+          <p:nvPr>
+            <p:ph type="title"/>
+          </p:nvPr>
+        </p:nvSpPr>
+        <p:spPr>
+          <a:xfrm>
+            <a:off x="311700" y="445025"/>
+            <a:ext cx="8520600" cy="572700"/>
+          </a:xfrm>
+          <a:prstGeom prst="rect">
+            <a:avLst/>
+          </a:prstGeom>
+        </p:spPr>
+        <p:txBody>
+          <a:bodyPr spcFirstLastPara="1" wrap="square" lIns="91425" tIns="91425" rIns="91425" bIns="91425" anchor="t" anchorCtr="0">
+            <a:noAutofit/>
+          </a:bodyPr>
+          <a:lstStyle/>
+          <a:p>
+            <a:pPr marL="0" lvl="0" indent="0" algn="l" rtl="0">
+              <a:spcBef>
+                <a:spcPts val="0"/>
+              </a:spcBef>
+              <a:spcAft>
+                <a:spcPts val="0"/>
+              </a:spcAft>
+              <a:buNone/>
+            </a:pPr>
+            <a:r>
+              <a:rPr lang="en" b="1" dirty="0"/>
+              <a:t>Addressing Relevant Implications</a:t>
+            </a:r>
+            <a:endParaRPr b="1" dirty="0"/>
+          </a:p>
+        </p:txBody>
+      </p:sp>
+      <p:sp>
+        <p:nvSpPr>
+          <p:cNvPr id="85" name="Google Shape;85;p18"/>
+          <p:cNvSpPr txBox="1">
+            <a:spLocks noGrp="1"/>
+          </p:cNvSpPr>
+          <p:nvPr>
+            <p:ph type="body" idx="1"/>
+          </p:nvPr>
+        </p:nvSpPr>
+        <p:spPr>
+          <a:xfrm>
+            <a:off x="311700" y="1152475"/>
+            <a:ext cx="8520600" cy="3416400"/>
+          </a:xfrm>
+          <a:prstGeom prst="rect">
+            <a:avLst/>
+          </a:prstGeom>
+        </p:spPr>
+        <p:txBody>
+          <a:bodyPr spcFirstLastPara="1" wrap="square" lIns="91425" tIns="91425" rIns="91425" bIns="91425" anchor="t" anchorCtr="0">
+            <a:noAutofit/>
+          </a:bodyPr>
+          <a:lstStyle/>
+          <a:p>
+            <a:pPr marL="0" lvl="0" indent="0" algn="l" rtl="0">
+              <a:spcBef>
+                <a:spcPts val="0"/>
+              </a:spcBef>
+              <a:spcAft>
+                <a:spcPts val="1600"/>
+              </a:spcAft>
+              <a:buNone/>
+            </a:pPr>
+            <a:r>
+              <a:rPr lang="en-NZ" i="1" dirty="0"/>
+              <a:t>I’ve comprehensively tested my outcome to ensure that the functionality implication has been address (i.e., it works for expected, unexpected, and boundary values).</a:t>
+            </a:r>
+          </a:p>
+          <a:p>
+            <a:pPr marL="0" lvl="0" indent="0" algn="l" rtl="0">
+              <a:spcBef>
+                <a:spcPts val="0"/>
+              </a:spcBef>
+              <a:spcAft>
+                <a:spcPts val="1600"/>
+              </a:spcAft>
+              <a:buNone/>
+            </a:pPr>
+            <a:r>
+              <a:rPr lang="en-NZ" i="1" dirty="0"/>
+              <a:t>The inclusion of optional instructions and clear error messages help to make the out come easy to use (i.e., addresses the Usability implication)</a:t>
+            </a:r>
+          </a:p>
+          <a:p>
+            <a:pPr marL="0" lvl="0" indent="0" algn="l" rtl="0">
+              <a:spcBef>
+                <a:spcPts val="0"/>
+              </a:spcBef>
+              <a:spcAft>
+                <a:spcPts val="1600"/>
+              </a:spcAft>
+              <a:buNone/>
+            </a:pPr>
+            <a:r>
+              <a:rPr lang="en-NZ" i="1" dirty="0"/>
+              <a:t>I’ve also carefully spaced the program’s output and used a statement generator function to address the aesthetics implication. Whilst aesthetics is not the main focus of text based programs, ensuring the outcome looks good also helps address the usability implication.</a:t>
+            </a:r>
+          </a:p>
+        </p:txBody>
+      </p:sp>
+    </p:spTree>
+    <p:extLst>
+      <p:ext uri="{BB962C8B-B14F-4D97-AF65-F5344CB8AC3E}">
+        <p14:creationId xmlns:p14="http://schemas.microsoft.com/office/powerpoint/2010/main" val="251612550"/>
+      </p:ext>
+    </p:extLst>
+  </p:cSld>
+  <p:clrMapOvr>
+    <a:masterClrMapping/>
+  </p:clrMapOvr>
+</p:sld>
+</file>
+
+<file path=ppt/slides/slide29.xml><?xml version="1.0" encoding="utf-8"?>
+<p:sld xmlns:a="http://schemas.openxmlformats.org/drawingml/2006/main" xmlns:r="http://schemas.openxmlformats.org/officeDocument/2006/relationships" xmlns:p="http://schemas.openxmlformats.org/presentationml/2006/main">
+  <p:cSld>
+    <p:spTree>
+      <p:nvGrpSpPr>
+        <p:cNvPr id="1" name="Shape 83"/>
+        <p:cNvGrpSpPr/>
+        <p:nvPr/>
+      </p:nvGrpSpPr>
+      <p:grpSpPr>
+        <a:xfrm>
+          <a:off x="0" y="0"/>
+          <a:ext cx="0" cy="0"/>
+          <a:chOff x="0" y="0"/>
+          <a:chExt cx="0" cy="0"/>
+        </a:xfrm>
+      </p:grpSpPr>
+      <p:sp>
+        <p:nvSpPr>
+          <p:cNvPr id="84" name="Google Shape;84;p18"/>
+          <p:cNvSpPr txBox="1">
+            <a:spLocks noGrp="1"/>
+          </p:cNvSpPr>
+          <p:nvPr>
+            <p:ph type="title"/>
+          </p:nvPr>
+        </p:nvSpPr>
+        <p:spPr>
+          <a:xfrm>
+            <a:off x="311700" y="445025"/>
+            <a:ext cx="8520600" cy="572700"/>
+          </a:xfrm>
+          <a:prstGeom prst="rect">
+            <a:avLst/>
+          </a:prstGeom>
+        </p:spPr>
+        <p:txBody>
+          <a:bodyPr spcFirstLastPara="1" wrap="square" lIns="91425" tIns="91425" rIns="91425" bIns="91425" anchor="t" anchorCtr="0">
+            <a:noAutofit/>
+          </a:bodyPr>
+          <a:lstStyle/>
+          <a:p>
+            <a:pPr marL="0" lvl="0" indent="0" algn="l" rtl="0">
+              <a:spcBef>
+                <a:spcPts val="0"/>
+              </a:spcBef>
+              <a:spcAft>
+                <a:spcPts val="0"/>
+              </a:spcAft>
+              <a:buNone/>
+            </a:pPr>
+            <a:r>
+              <a:rPr lang="en" b="1" dirty="0"/>
+              <a:t>Addressing Relevant Implications</a:t>
+            </a:r>
+            <a:endParaRPr b="1" dirty="0"/>
+          </a:p>
+        </p:txBody>
+      </p:sp>
+      <p:sp>
+        <p:nvSpPr>
+          <p:cNvPr id="85" name="Google Shape;85;p18"/>
+          <p:cNvSpPr txBox="1">
+            <a:spLocks noGrp="1"/>
+          </p:cNvSpPr>
+          <p:nvPr>
+            <p:ph type="body" idx="1"/>
+          </p:nvPr>
+        </p:nvSpPr>
+        <p:spPr>
+          <a:xfrm>
+            <a:off x="311700" y="1152475"/>
+            <a:ext cx="8520600" cy="3416400"/>
+          </a:xfrm>
+          <a:prstGeom prst="rect">
+            <a:avLst/>
+          </a:prstGeom>
+        </p:spPr>
+        <p:txBody>
+          <a:bodyPr spcFirstLastPara="1" wrap="square" lIns="91425" tIns="91425" rIns="91425" bIns="91425" anchor="t" anchorCtr="0">
+            <a:noAutofit/>
+          </a:bodyPr>
+          <a:lstStyle/>
+          <a:p>
+            <a:pPr marL="0" lvl="0" indent="0" algn="l" rtl="0">
+              <a:spcBef>
+                <a:spcPts val="0"/>
+              </a:spcBef>
+              <a:spcAft>
+                <a:spcPts val="1600"/>
+              </a:spcAft>
+              <a:buNone/>
+            </a:pPr>
+            <a:r>
+              <a:rPr lang="en" i="1" dirty="0"/>
+              <a:t>Finally, my program has a limit on the amount users can spend. This addreses the social implicayion as we have a gambling game but want toensure that users do not spend an excessive amount of money. </a:t>
+            </a:r>
+            <a:endParaRPr i="1" dirty="0"/>
+          </a:p>
+        </p:txBody>
+      </p:sp>
+    </p:spTree>
+    <p:extLst>
+      <p:ext uri="{BB962C8B-B14F-4D97-AF65-F5344CB8AC3E}">
+        <p14:creationId xmlns:p14="http://schemas.microsoft.com/office/powerpoint/2010/main" val="824036131"/>
       </p:ext>
     </p:extLst>
   </p:cSld>
@@ -13441,263 +13307,6 @@
             </a:pPr>
             <a:r>
               <a:rPr lang="en" b="1" dirty="0"/>
-              <a:t>Addressing Relevant Implications</a:t>
-            </a:r>
-            <a:endParaRPr b="1" dirty="0"/>
-          </a:p>
-        </p:txBody>
-      </p:sp>
-      <p:sp>
-        <p:nvSpPr>
-          <p:cNvPr id="85" name="Google Shape;85;p18"/>
-          <p:cNvSpPr txBox="1">
-            <a:spLocks noGrp="1"/>
-          </p:cNvSpPr>
-          <p:nvPr>
-            <p:ph type="body" idx="1"/>
-          </p:nvPr>
-        </p:nvSpPr>
-        <p:spPr>
-          <a:xfrm>
-            <a:off x="311700" y="1152475"/>
-            <a:ext cx="8520600" cy="3416400"/>
-          </a:xfrm>
-          <a:prstGeom prst="rect">
-            <a:avLst/>
-          </a:prstGeom>
-        </p:spPr>
-        <p:txBody>
-          <a:bodyPr spcFirstLastPara="1" wrap="square" lIns="91425" tIns="91425" rIns="91425" bIns="91425" anchor="t" anchorCtr="0">
-            <a:noAutofit/>
-          </a:bodyPr>
-          <a:lstStyle/>
-          <a:p>
-            <a:pPr marL="0" lvl="0" indent="0" algn="l" rtl="0">
-              <a:spcBef>
-                <a:spcPts val="0"/>
-              </a:spcBef>
-              <a:spcAft>
-                <a:spcPts val="1600"/>
-              </a:spcAft>
-              <a:buNone/>
-            </a:pPr>
-            <a:r>
-              <a:rPr lang="en-NZ" i="1" dirty="0"/>
-              <a:t>I’ve comprehensively tested my outcome to ensure that the functionality implication has been address (i.e., it works for expected, unexpected, and boundary values).</a:t>
-            </a:r>
-          </a:p>
-          <a:p>
-            <a:pPr marL="0" lvl="0" indent="0" algn="l" rtl="0">
-              <a:spcBef>
-                <a:spcPts val="0"/>
-              </a:spcBef>
-              <a:spcAft>
-                <a:spcPts val="1600"/>
-              </a:spcAft>
-              <a:buNone/>
-            </a:pPr>
-            <a:r>
-              <a:rPr lang="en-NZ" i="1" dirty="0"/>
-              <a:t>The inclusion of optional instructions and clear error messages help to make the out come easy to use (i.e., addresses the Usability implication)</a:t>
-            </a:r>
-          </a:p>
-          <a:p>
-            <a:pPr marL="0" lvl="0" indent="0" algn="l" rtl="0">
-              <a:spcBef>
-                <a:spcPts val="0"/>
-              </a:spcBef>
-              <a:spcAft>
-                <a:spcPts val="1600"/>
-              </a:spcAft>
-              <a:buNone/>
-            </a:pPr>
-            <a:r>
-              <a:rPr lang="en-NZ" i="1" dirty="0"/>
-              <a:t>I’ve also carefully spaced the program’s output and used a statement generator function to address the aesthetics implication. Whilst aesthetics is not the main focus of text based programs, ensuring the outcome looks good also helps address the usability implication.</a:t>
-            </a:r>
-          </a:p>
-        </p:txBody>
-      </p:sp>
-    </p:spTree>
-    <p:extLst>
-      <p:ext uri="{BB962C8B-B14F-4D97-AF65-F5344CB8AC3E}">
-        <p14:creationId xmlns:p14="http://schemas.microsoft.com/office/powerpoint/2010/main" val="251612550"/>
-      </p:ext>
-    </p:extLst>
-  </p:cSld>
-  <p:clrMapOvr>
-    <a:masterClrMapping/>
-  </p:clrMapOvr>
-</p:sld>
-</file>
-
-<file path=ppt/slides/slide31.xml><?xml version="1.0" encoding="utf-8"?>
-<p:sld xmlns:a="http://schemas.openxmlformats.org/drawingml/2006/main" xmlns:r="http://schemas.openxmlformats.org/officeDocument/2006/relationships" xmlns:p="http://schemas.openxmlformats.org/presentationml/2006/main">
-  <p:cSld>
-    <p:spTree>
-      <p:nvGrpSpPr>
-        <p:cNvPr id="1" name="Shape 83"/>
-        <p:cNvGrpSpPr/>
-        <p:nvPr/>
-      </p:nvGrpSpPr>
-      <p:grpSpPr>
-        <a:xfrm>
-          <a:off x="0" y="0"/>
-          <a:ext cx="0" cy="0"/>
-          <a:chOff x="0" y="0"/>
-          <a:chExt cx="0" cy="0"/>
-        </a:xfrm>
-      </p:grpSpPr>
-      <p:sp>
-        <p:nvSpPr>
-          <p:cNvPr id="84" name="Google Shape;84;p18"/>
-          <p:cNvSpPr txBox="1">
-            <a:spLocks noGrp="1"/>
-          </p:cNvSpPr>
-          <p:nvPr>
-            <p:ph type="title"/>
-          </p:nvPr>
-        </p:nvSpPr>
-        <p:spPr>
-          <a:xfrm>
-            <a:off x="311700" y="445025"/>
-            <a:ext cx="8520600" cy="572700"/>
-          </a:xfrm>
-          <a:prstGeom prst="rect">
-            <a:avLst/>
-          </a:prstGeom>
-        </p:spPr>
-        <p:txBody>
-          <a:bodyPr spcFirstLastPara="1" wrap="square" lIns="91425" tIns="91425" rIns="91425" bIns="91425" anchor="t" anchorCtr="0">
-            <a:noAutofit/>
-          </a:bodyPr>
-          <a:lstStyle/>
-          <a:p>
-            <a:pPr marL="0" lvl="0" indent="0" algn="l" rtl="0">
-              <a:spcBef>
-                <a:spcPts val="0"/>
-              </a:spcBef>
-              <a:spcAft>
-                <a:spcPts val="0"/>
-              </a:spcAft>
-              <a:buNone/>
-            </a:pPr>
-            <a:r>
-              <a:rPr lang="en" b="1" dirty="0"/>
-              <a:t>Addressing Relevant Implications</a:t>
-            </a:r>
-            <a:endParaRPr b="1" dirty="0"/>
-          </a:p>
-        </p:txBody>
-      </p:sp>
-      <p:sp>
-        <p:nvSpPr>
-          <p:cNvPr id="85" name="Google Shape;85;p18"/>
-          <p:cNvSpPr txBox="1">
-            <a:spLocks noGrp="1"/>
-          </p:cNvSpPr>
-          <p:nvPr>
-            <p:ph type="body" idx="1"/>
-          </p:nvPr>
-        </p:nvSpPr>
-        <p:spPr>
-          <a:xfrm>
-            <a:off x="311700" y="1152475"/>
-            <a:ext cx="8520600" cy="3416400"/>
-          </a:xfrm>
-          <a:prstGeom prst="rect">
-            <a:avLst/>
-          </a:prstGeom>
-        </p:spPr>
-        <p:txBody>
-          <a:bodyPr spcFirstLastPara="1" wrap="square" lIns="91425" tIns="91425" rIns="91425" bIns="91425" anchor="t" anchorCtr="0">
-            <a:noAutofit/>
-          </a:bodyPr>
-          <a:lstStyle/>
-          <a:p>
-            <a:pPr marL="0" lvl="0" indent="0" algn="l" rtl="0">
-              <a:spcBef>
-                <a:spcPts val="0"/>
-              </a:spcBef>
-              <a:spcAft>
-                <a:spcPts val="1600"/>
-              </a:spcAft>
-              <a:buNone/>
-            </a:pPr>
-            <a:r>
-              <a:rPr lang="en" i="1" dirty="0"/>
-              <a:t>Finally, my program has a limit on the amount users can spend. This addreses the social implicayion as we have a gambling game but want toensure that users do not spend an excessive amount of money. </a:t>
-            </a:r>
-            <a:endParaRPr i="1" dirty="0"/>
-          </a:p>
-        </p:txBody>
-      </p:sp>
-    </p:spTree>
-    <p:extLst>
-      <p:ext uri="{BB962C8B-B14F-4D97-AF65-F5344CB8AC3E}">
-        <p14:creationId xmlns:p14="http://schemas.microsoft.com/office/powerpoint/2010/main" val="824036131"/>
-      </p:ext>
-    </p:extLst>
-  </p:cSld>
-  <p:clrMapOvr>
-    <a:masterClrMapping/>
-  </p:clrMapOvr>
-</p:sld>
-</file>
-
-<file path=ppt/slides/slide32.xml><?xml version="1.0" encoding="utf-8"?>
-<p:sld xmlns:a="http://schemas.openxmlformats.org/drawingml/2006/main" xmlns:r="http://schemas.openxmlformats.org/officeDocument/2006/relationships" xmlns:p="http://schemas.openxmlformats.org/presentationml/2006/main">
-  <p:cSld>
-    <p:spTree>
-      <p:nvGrpSpPr>
-        <p:cNvPr id="1" name="Shape 83"/>
-        <p:cNvGrpSpPr/>
-        <p:nvPr/>
-      </p:nvGrpSpPr>
-      <p:grpSpPr>
-        <a:xfrm>
-          <a:off x="0" y="0"/>
-          <a:ext cx="0" cy="0"/>
-          <a:chOff x="0" y="0"/>
-          <a:chExt cx="0" cy="0"/>
-        </a:xfrm>
-      </p:grpSpPr>
-      <p:sp>
-        <p:nvSpPr>
-          <p:cNvPr id="84" name="Google Shape;84;p18"/>
-          <p:cNvSpPr txBox="1">
-            <a:spLocks noGrp="1"/>
-          </p:cNvSpPr>
-          <p:nvPr>
-            <p:ph type="title"/>
-          </p:nvPr>
-        </p:nvSpPr>
-        <p:spPr>
-          <a:xfrm>
-            <a:off x="311700" y="445025"/>
-            <a:ext cx="8520600" cy="572700"/>
-          </a:xfrm>
-          <a:prstGeom prst="rect">
-            <a:avLst/>
-          </a:prstGeom>
-        </p:spPr>
-        <p:txBody>
-          <a:bodyPr spcFirstLastPara="1" wrap="square" lIns="91425" tIns="91425" rIns="91425" bIns="91425" anchor="t" anchorCtr="0">
-            <a:noAutofit/>
-          </a:bodyPr>
-          <a:lstStyle/>
-          <a:p>
-            <a:pPr marL="0" lvl="0" indent="0" algn="l" rtl="0">
-              <a:spcBef>
-                <a:spcPts val="0"/>
-              </a:spcBef>
-              <a:spcAft>
-                <a:spcPts val="0"/>
-              </a:spcAft>
-              <a:buNone/>
-            </a:pPr>
-            <a:r>
-              <a:rPr lang="en" b="1" dirty="0"/>
               <a:t>Trialling Slide</a:t>
             </a:r>
             <a:endParaRPr b="1" dirty="0"/>
@@ -14155,8 +13764,8 @@
               <a:buNone/>
             </a:pPr>
             <a:r>
-              <a:rPr lang="en" b="1"/>
-              <a:t>Get user choice</a:t>
+              <a:rPr lang="en" b="1" dirty="0"/>
+              <a:t>Round Mechanics</a:t>
             </a:r>
             <a:endParaRPr b="1" dirty="0"/>
           </a:p>
@@ -14164,10 +13773,10 @@
       </p:sp>
       <p:pic>
         <p:nvPicPr>
-          <p:cNvPr id="2" name="Picture 1">
+          <p:cNvPr id="3" name="Picture 2">
             <a:extLst>
               <a:ext uri="{FF2B5EF4-FFF2-40B4-BE49-F238E27FC236}">
-                <a16:creationId xmlns:a16="http://schemas.microsoft.com/office/drawing/2014/main" id="{11826166-7BAB-400E-A79F-F4289F52D61E}"/>
+                <a16:creationId xmlns:a16="http://schemas.microsoft.com/office/drawing/2014/main" id="{4C06E00B-8301-47D8-AF43-E56121E06830}"/>
               </a:ext>
             </a:extLst>
           </p:cNvPr>
@@ -14184,8 +13793,8 @@
         </p:blipFill>
         <p:spPr>
           <a:xfrm>
-            <a:off x="513764" y="1088550"/>
-            <a:ext cx="4323280" cy="3891709"/>
+            <a:off x="596155" y="1345095"/>
+            <a:ext cx="2079583" cy="3271011"/>
           </a:xfrm>
           <a:prstGeom prst="rect">
             <a:avLst/>
@@ -14201,302 +13810,6 @@
 </file>
 
 <file path=ppt/slides/slide8.xml><?xml version="1.0" encoding="utf-8"?>
-<p:sld xmlns:a="http://schemas.openxmlformats.org/drawingml/2006/main" xmlns:r="http://schemas.openxmlformats.org/officeDocument/2006/relationships" xmlns:p="http://schemas.openxmlformats.org/presentationml/2006/main">
-  <p:cSld>
-    <p:spTree>
-      <p:nvGrpSpPr>
-        <p:cNvPr id="1" name="Shape 77"/>
-        <p:cNvGrpSpPr/>
-        <p:nvPr/>
-      </p:nvGrpSpPr>
-      <p:grpSpPr>
-        <a:xfrm>
-          <a:off x="0" y="0"/>
-          <a:ext cx="0" cy="0"/>
-          <a:chOff x="0" y="0"/>
-          <a:chExt cx="0" cy="0"/>
-        </a:xfrm>
-      </p:grpSpPr>
-      <p:sp>
-        <p:nvSpPr>
-          <p:cNvPr id="78" name="Google Shape;78;p17"/>
-          <p:cNvSpPr txBox="1">
-            <a:spLocks noGrp="1"/>
-          </p:cNvSpPr>
-          <p:nvPr>
-            <p:ph type="title"/>
-          </p:nvPr>
-        </p:nvSpPr>
-        <p:spPr>
-          <a:xfrm>
-            <a:off x="311700" y="445025"/>
-            <a:ext cx="8520600" cy="572700"/>
-          </a:xfrm>
-          <a:prstGeom prst="rect">
-            <a:avLst/>
-          </a:prstGeom>
-        </p:spPr>
-        <p:txBody>
-          <a:bodyPr spcFirstLastPara="1" wrap="square" lIns="91425" tIns="91425" rIns="91425" bIns="91425" anchor="t" anchorCtr="0">
-            <a:noAutofit/>
-          </a:bodyPr>
-          <a:lstStyle/>
-          <a:p>
-            <a:pPr marL="0" lvl="0" indent="0" algn="l" rtl="0">
-              <a:spcBef>
-                <a:spcPts val="0"/>
-              </a:spcBef>
-              <a:spcAft>
-                <a:spcPts val="0"/>
-              </a:spcAft>
-              <a:buNone/>
-            </a:pPr>
-            <a:r>
-              <a:rPr lang="en" b="1" dirty="0"/>
-              <a:t>Component 1 - Test Plan (?and screenshot)</a:t>
-            </a:r>
-            <a:endParaRPr b="1" dirty="0"/>
-          </a:p>
-        </p:txBody>
-      </p:sp>
-      <p:graphicFrame>
-        <p:nvGraphicFramePr>
-          <p:cNvPr id="79" name="Google Shape;79;p17"/>
-          <p:cNvGraphicFramePr/>
-          <p:nvPr/>
-        </p:nvGraphicFramePr>
-        <p:xfrm>
-          <a:off x="382475" y="1267724"/>
-          <a:ext cx="8520600" cy="2106510"/>
-        </p:xfrm>
-        <a:graphic>
-          <a:graphicData uri="http://schemas.openxmlformats.org/drawingml/2006/table">
-            <a:tbl>
-              <a:tblPr>
-                <a:tableStyleId>{35758FB7-9AC5-4552-8A53-C91805E547FA}</a:tableStyleId>
-              </a:tblPr>
-              <a:tblGrid>
-                <a:gridCol w="4260300">
-                  <a:extLst>
-                    <a:ext uri="{9D8B030D-6E8A-4147-A177-3AD203B41FA5}">
-                      <a16:colId xmlns:a16="http://schemas.microsoft.com/office/drawing/2014/main" val="20000"/>
-                    </a:ext>
-                  </a:extLst>
-                </a:gridCol>
-                <a:gridCol w="4260300">
-                  <a:extLst>
-                    <a:ext uri="{9D8B030D-6E8A-4147-A177-3AD203B41FA5}">
-                      <a16:colId xmlns:a16="http://schemas.microsoft.com/office/drawing/2014/main" val="20001"/>
-                    </a:ext>
-                  </a:extLst>
-                </a:gridCol>
-              </a:tblGrid>
-              <a:tr h="501540">
-                <a:tc>
-                  <a:txBody>
-                    <a:bodyPr/>
-                    <a:lstStyle/>
-                    <a:p>
-                      <a:pPr marL="0" lvl="0" indent="0" algn="l" rtl="0">
-                        <a:spcBef>
-                          <a:spcPts val="0"/>
-                        </a:spcBef>
-                        <a:spcAft>
-                          <a:spcPts val="0"/>
-                        </a:spcAft>
-                        <a:buNone/>
-                      </a:pPr>
-                      <a:r>
-                        <a:rPr lang="en" sz="1800" dirty="0"/>
-                        <a:t>Test Case</a:t>
-                      </a:r>
-                      <a:endParaRPr sz="1800" b="1" dirty="0"/>
-                    </a:p>
-                  </a:txBody>
-                  <a:tcPr marL="91425" marR="91425" marT="91425" marB="91425"/>
-                </a:tc>
-                <a:tc>
-                  <a:txBody>
-                    <a:bodyPr/>
-                    <a:lstStyle/>
-                    <a:p>
-                      <a:pPr marL="0" lvl="0" indent="0" algn="l" rtl="0">
-                        <a:spcBef>
-                          <a:spcPts val="0"/>
-                        </a:spcBef>
-                        <a:spcAft>
-                          <a:spcPts val="0"/>
-                        </a:spcAft>
-                        <a:buNone/>
-                      </a:pPr>
-                      <a:r>
-                        <a:rPr lang="en" sz="1800"/>
-                        <a:t>Expected Values</a:t>
-                      </a:r>
-                      <a:endParaRPr sz="1800" b="1"/>
-                    </a:p>
-                  </a:txBody>
-                  <a:tcPr marL="91425" marR="91425" marT="91425" marB="91425"/>
-                </a:tc>
-                <a:extLst>
-                  <a:ext uri="{0D108BD9-81ED-4DB2-BD59-A6C34878D82A}">
-                    <a16:rowId xmlns:a16="http://schemas.microsoft.com/office/drawing/2014/main" val="10000"/>
-                  </a:ext>
-                </a:extLst>
-              </a:tr>
-              <a:tr h="802485">
-                <a:tc>
-                  <a:txBody>
-                    <a:bodyPr/>
-                    <a:lstStyle/>
-                    <a:p>
-                      <a:pPr marL="0" lvl="0" indent="0" algn="l" rtl="0">
-                        <a:spcBef>
-                          <a:spcPts val="0"/>
-                        </a:spcBef>
-                        <a:spcAft>
-                          <a:spcPts val="0"/>
-                        </a:spcAft>
-                        <a:buNone/>
-                      </a:pPr>
-                      <a:r>
-                        <a:rPr lang="en-US" sz="1800" dirty="0"/>
-                        <a:t>Have you played before? Maybe</a:t>
-                      </a:r>
-                    </a:p>
-                    <a:p>
-                      <a:pPr marL="0" lvl="0" indent="0" algn="l" rtl="0">
-                        <a:spcBef>
-                          <a:spcPts val="0"/>
-                        </a:spcBef>
-                        <a:spcAft>
-                          <a:spcPts val="0"/>
-                        </a:spcAft>
-                        <a:buNone/>
-                      </a:pPr>
-                      <a:r>
-                        <a:rPr lang="en-US" sz="1800" dirty="0"/>
-                        <a:t>Have you played before? Yes</a:t>
-                      </a:r>
-                      <a:endParaRPr sz="1800" dirty="0"/>
-                    </a:p>
-                  </a:txBody>
-                  <a:tcPr marL="91425" marR="91425" marT="91425" marB="91425"/>
-                </a:tc>
-                <a:tc>
-                  <a:txBody>
-                    <a:bodyPr/>
-                    <a:lstStyle/>
-                    <a:p>
-                      <a:pPr marL="0" lvl="0" indent="0" algn="l" rtl="0">
-                        <a:spcBef>
-                          <a:spcPts val="0"/>
-                        </a:spcBef>
-                        <a:spcAft>
-                          <a:spcPts val="0"/>
-                        </a:spcAft>
-                        <a:buNone/>
-                      </a:pPr>
-                      <a:r>
-                        <a:rPr lang="en-US" sz="1800" dirty="0"/>
-                        <a:t>&lt;error&gt; Please choose y / n</a:t>
-                      </a:r>
-                    </a:p>
-                    <a:p>
-                      <a:pPr marL="0" lvl="0" indent="0" algn="l" rtl="0">
-                        <a:spcBef>
-                          <a:spcPts val="0"/>
-                        </a:spcBef>
-                        <a:spcAft>
-                          <a:spcPts val="0"/>
-                        </a:spcAft>
-                        <a:buNone/>
-                      </a:pPr>
-                      <a:r>
-                        <a:rPr lang="en-US" sz="1800" dirty="0"/>
-                        <a:t>Game Starts</a:t>
-                      </a:r>
-                    </a:p>
-                  </a:txBody>
-                  <a:tcPr marL="91425" marR="91425" marT="91425" marB="91425"/>
-                </a:tc>
-                <a:extLst>
-                  <a:ext uri="{0D108BD9-81ED-4DB2-BD59-A6C34878D82A}">
-                    <a16:rowId xmlns:a16="http://schemas.microsoft.com/office/drawing/2014/main" val="10001"/>
-                  </a:ext>
-                </a:extLst>
-              </a:tr>
-              <a:tr h="802485">
-                <a:tc>
-                  <a:txBody>
-                    <a:bodyPr/>
-                    <a:lstStyle/>
-                    <a:p>
-                      <a:pPr marL="0" lvl="0" indent="0" algn="l" rtl="0">
-                        <a:spcBef>
-                          <a:spcPts val="0"/>
-                        </a:spcBef>
-                        <a:spcAft>
-                          <a:spcPts val="0"/>
-                        </a:spcAft>
-                        <a:buNone/>
-                      </a:pPr>
-                      <a:r>
-                        <a:rPr lang="en-US" sz="1800" dirty="0"/>
-                        <a:t>Have you played before? No</a:t>
-                      </a:r>
-                      <a:endParaRPr sz="1800" dirty="0"/>
-                    </a:p>
-                  </a:txBody>
-                  <a:tcPr marL="91425" marR="91425" marT="91425" marB="91425"/>
-                </a:tc>
-                <a:tc>
-                  <a:txBody>
-                    <a:bodyPr/>
-                    <a:lstStyle/>
-                    <a:p>
-                      <a:pPr marL="0" lvl="0" indent="0" algn="l" rtl="0">
-                        <a:spcBef>
-                          <a:spcPts val="0"/>
-                        </a:spcBef>
-                        <a:spcAft>
-                          <a:spcPts val="0"/>
-                        </a:spcAft>
-                        <a:buNone/>
-                      </a:pPr>
-                      <a:r>
-                        <a:rPr lang="en-US" sz="1800" dirty="0"/>
-                        <a:t>Show instructions, then start game.</a:t>
-                      </a:r>
-                      <a:endParaRPr sz="1800" dirty="0"/>
-                    </a:p>
-                  </a:txBody>
-                  <a:tcPr marL="91425" marR="91425" marT="91425" marB="91425"/>
-                </a:tc>
-                <a:extLst>
-                  <a:ext uri="{0D108BD9-81ED-4DB2-BD59-A6C34878D82A}">
-                    <a16:rowId xmlns:a16="http://schemas.microsoft.com/office/drawing/2014/main" val="4058153661"/>
-                  </a:ext>
-                </a:extLst>
-              </a:tr>
-            </a:tbl>
-          </a:graphicData>
-        </a:graphic>
-      </p:graphicFrame>
-    </p:spTree>
-    <p:extLst>
-      <p:ext uri="{BB962C8B-B14F-4D97-AF65-F5344CB8AC3E}">
-        <p14:creationId xmlns:p14="http://schemas.microsoft.com/office/powerpoint/2010/main" val="2007169343"/>
-      </p:ext>
-    </p:extLst>
-  </p:cSld>
-  <p:clrMapOvr>
-    <a:masterClrMapping/>
-  </p:clrMapOvr>
-</p:sld>
-</file>
-
-<file path=ppt/slides/slide9.xml><?xml version="1.0" encoding="utf-8"?>
 <p:sld xmlns:a="http://schemas.openxmlformats.org/drawingml/2006/main" xmlns:r="http://schemas.openxmlformats.org/officeDocument/2006/relationships" xmlns:p="http://schemas.openxmlformats.org/presentationml/2006/main">
   <p:cSld>
     <p:spTree>
@@ -14873,6 +14186,171 @@
         <p14:creationId xmlns:p14="http://schemas.microsoft.com/office/powerpoint/2010/main" val="249405800"/>
       </p:ext>
     </p:extLst>
+  </p:cSld>
+  <p:clrMapOvr>
+    <a:masterClrMapping/>
+  </p:clrMapOvr>
+</p:sld>
+</file>
+
+<file path=ppt/slides/slide9.xml><?xml version="1.0" encoding="utf-8"?>
+<p:sld xmlns:a="http://schemas.openxmlformats.org/drawingml/2006/main" xmlns:r="http://schemas.openxmlformats.org/officeDocument/2006/relationships" xmlns:p="http://schemas.openxmlformats.org/presentationml/2006/main">
+  <p:cSld>
+    <p:bg>
+      <p:bgPr>
+        <a:solidFill>
+          <a:srgbClr val="FFD966"/>
+        </a:solidFill>
+        <a:effectLst/>
+      </p:bgPr>
+    </p:bg>
+    <p:spTree>
+      <p:nvGrpSpPr>
+        <p:cNvPr id="1" name="Shape 83"/>
+        <p:cNvGrpSpPr/>
+        <p:nvPr/>
+      </p:nvGrpSpPr>
+      <p:grpSpPr>
+        <a:xfrm>
+          <a:off x="0" y="0"/>
+          <a:ext cx="0" cy="0"/>
+          <a:chOff x="0" y="0"/>
+          <a:chExt cx="0" cy="0"/>
+        </a:xfrm>
+      </p:grpSpPr>
+      <p:sp>
+        <p:nvSpPr>
+          <p:cNvPr id="84" name="Google Shape;84;p18"/>
+          <p:cNvSpPr txBox="1">
+            <a:spLocks noGrp="1"/>
+          </p:cNvSpPr>
+          <p:nvPr>
+            <p:ph type="title"/>
+          </p:nvPr>
+        </p:nvSpPr>
+        <p:spPr>
+          <a:xfrm>
+            <a:off x="311700" y="445025"/>
+            <a:ext cx="8520600" cy="572700"/>
+          </a:xfrm>
+          <a:prstGeom prst="rect">
+            <a:avLst/>
+          </a:prstGeom>
+        </p:spPr>
+        <p:txBody>
+          <a:bodyPr spcFirstLastPara="1" wrap="square" lIns="91425" tIns="91425" rIns="91425" bIns="91425" anchor="t" anchorCtr="0">
+            <a:noAutofit/>
+          </a:bodyPr>
+          <a:lstStyle/>
+          <a:p>
+            <a:pPr marL="0" lvl="0" indent="0" algn="l" rtl="0">
+              <a:spcBef>
+                <a:spcPts val="0"/>
+              </a:spcBef>
+              <a:spcAft>
+                <a:spcPts val="0"/>
+              </a:spcAft>
+              <a:buNone/>
+            </a:pPr>
+            <a:r>
+              <a:rPr lang="en-NZ" b="1" dirty="0"/>
+              <a:t>Round Checker Trials</a:t>
+            </a:r>
+            <a:endParaRPr b="1" dirty="0"/>
+          </a:p>
+        </p:txBody>
+      </p:sp>
+      <p:sp>
+        <p:nvSpPr>
+          <p:cNvPr id="85" name="Google Shape;85;p18"/>
+          <p:cNvSpPr txBox="1">
+            <a:spLocks noGrp="1"/>
+          </p:cNvSpPr>
+          <p:nvPr>
+            <p:ph type="body" idx="1"/>
+          </p:nvPr>
+        </p:nvSpPr>
+        <p:spPr>
+          <a:xfrm>
+            <a:off x="311700" y="1152475"/>
+            <a:ext cx="8520600" cy="3416400"/>
+          </a:xfrm>
+          <a:prstGeom prst="rect">
+            <a:avLst/>
+          </a:prstGeom>
+        </p:spPr>
+        <p:txBody>
+          <a:bodyPr spcFirstLastPara="1" wrap="square" lIns="91425" tIns="91425" rIns="91425" bIns="91425" anchor="t" anchorCtr="0">
+            <a:noAutofit/>
+          </a:bodyPr>
+          <a:lstStyle/>
+          <a:p>
+            <a:pPr marL="0" lvl="0" indent="0" algn="l" rtl="0">
+              <a:spcBef>
+                <a:spcPts val="0"/>
+              </a:spcBef>
+              <a:spcAft>
+                <a:spcPts val="1600"/>
+              </a:spcAft>
+              <a:buNone/>
+            </a:pPr>
+            <a:r>
+              <a:rPr lang="en-NZ" i="1" dirty="0"/>
+              <a:t>Trial 1 (03_round_mechanics_v1): Asks for rounds in the main routine and uses a function to check that users have entered a valid numbers. Code is quit inefficient and clunky.</a:t>
+            </a:r>
+          </a:p>
+          <a:p>
+            <a:pPr marL="0" lvl="0" indent="0" algn="l" rtl="0">
+              <a:spcBef>
+                <a:spcPts val="0"/>
+              </a:spcBef>
+              <a:spcAft>
+                <a:spcPts val="1600"/>
+              </a:spcAft>
+              <a:buNone/>
+            </a:pPr>
+            <a:r>
+              <a:rPr lang="en-NZ" i="1" dirty="0"/>
+              <a:t>Trial 2 (03_RPS_round_mechanics_v2): Integer checking function allows users to press &lt;enter&gt; or an integer. Main routine code works but is inefficient.</a:t>
+            </a:r>
+          </a:p>
+          <a:p>
+            <a:pPr marL="0" lvl="0" indent="0" algn="l" rtl="0">
+              <a:spcBef>
+                <a:spcPts val="0"/>
+              </a:spcBef>
+              <a:spcAft>
+                <a:spcPts val="1600"/>
+              </a:spcAft>
+              <a:buNone/>
+            </a:pPr>
+            <a:r>
+              <a:rPr lang="en-NZ" i="1" dirty="0"/>
+              <a:t>Trial 3 (03_RPS_round_mechanics_v3): Similar to Trial 2 but much more efficient. Uses ‘break’ to end loop.</a:t>
+            </a:r>
+          </a:p>
+          <a:p>
+            <a:pPr marL="0" lvl="0" indent="0" algn="l" rtl="0">
+              <a:spcBef>
+                <a:spcPts val="0"/>
+              </a:spcBef>
+              <a:spcAft>
+                <a:spcPts val="1600"/>
+              </a:spcAft>
+              <a:buNone/>
+            </a:pPr>
+            <a:r>
+              <a:rPr lang="en-NZ" i="1" dirty="0">
+                <a:highlight>
+                  <a:srgbClr val="FFFF00"/>
+                </a:highlight>
+              </a:rPr>
+              <a:t>Giving users two modes for game play makes it more likely that my game will appeal to a wider audience. It also enhances the games usability by following the user freedom heuristic. </a:t>
+            </a:r>
+          </a:p>
+        </p:txBody>
+      </p:sp>
+    </p:spTree>
   </p:cSld>
   <p:clrMapOvr>
     <a:masterClrMapping/>
@@ -15443,6 +14921,12 @@
 </file>
 
 <file path=customXml/item1.xml><?xml version="1.0" encoding="utf-8"?>
+<p:properties xmlns:p="http://schemas.microsoft.com/office/2006/metadata/properties" xmlns:xsi="http://www.w3.org/2001/XMLSchema-instance" xmlns:pc="http://schemas.microsoft.com/office/infopath/2007/PartnerControls">
+  <documentManagement/>
+</p:properties>
+</file>
+
+<file path=customXml/item2.xml><?xml version="1.0" encoding="utf-8"?>
 <ct:contentTypeSchema xmlns:ct="http://schemas.microsoft.com/office/2006/metadata/contentType" xmlns:ma="http://schemas.microsoft.com/office/2006/metadata/properties/metaAttributes" ct:_="" ma:_="" ma:contentTypeName="Document" ma:contentTypeID="0x010100CA5D8974BE78F944A108BF13F2B4CD6A" ma:contentTypeVersion="5" ma:contentTypeDescription="Create a new document." ma:contentTypeScope="" ma:versionID="1e3fc9c3ad9c16f936602fded155d02d">
   <xsd:schema xmlns:xsd="http://www.w3.org/2001/XMLSchema" xmlns:xs="http://www.w3.org/2001/XMLSchema" xmlns:p="http://schemas.microsoft.com/office/2006/metadata/properties" xmlns:ns2="4f936efd-07e9-48ba-b668-2cff2968e155" targetNamespace="http://schemas.microsoft.com/office/2006/metadata/properties" ma:root="true" ma:fieldsID="642a89d75a32cde1551b8a68a7f33533" ns2:_="">
     <xsd:import namespace="4f936efd-07e9-48ba-b668-2cff2968e155"/>
@@ -15594,12 +15078,6 @@
 </ct:contentTypeSchema>
 </file>
 
-<file path=customXml/item2.xml><?xml version="1.0" encoding="utf-8"?>
-<p:properties xmlns:p="http://schemas.microsoft.com/office/2006/metadata/properties" xmlns:xsi="http://www.w3.org/2001/XMLSchema-instance" xmlns:pc="http://schemas.microsoft.com/office/infopath/2007/PartnerControls">
-  <documentManagement/>
-</p:properties>
-</file>
-
 <file path=customXml/item3.xml><?xml version="1.0" encoding="utf-8"?>
 <?mso-contentType ?>
 <FormTemplates xmlns="http://schemas.microsoft.com/sharepoint/v3/contenttype/forms">
@@ -15610,6 +15088,15 @@
 </file>
 
 <file path=customXml/itemProps1.xml><?xml version="1.0" encoding="utf-8"?>
+<ds:datastoreItem xmlns:ds="http://schemas.openxmlformats.org/officeDocument/2006/customXml" ds:itemID="{516D10BD-0186-4A00-BD37-17D1BDE22574}">
+  <ds:schemaRefs>
+    <ds:schemaRef ds:uri="http://schemas.microsoft.com/office/2006/metadata/properties"/>
+    <ds:schemaRef ds:uri="http://schemas.microsoft.com/office/infopath/2007/PartnerControls"/>
+  </ds:schemaRefs>
+</ds:datastoreItem>
+</file>
+
+<file path=customXml/itemProps2.xml><?xml version="1.0" encoding="utf-8"?>
 <ds:datastoreItem xmlns:ds="http://schemas.openxmlformats.org/officeDocument/2006/customXml" ds:itemID="{ECB9EDA7-7083-49EA-8C49-43EBAAC54B35}">
   <ds:schemaRefs>
     <ds:schemaRef ds:uri="http://schemas.microsoft.com/office/2006/metadata/contentType"/>
@@ -15627,15 +15114,6 @@
 </ds:datastoreItem>
 </file>
 
-<file path=customXml/itemProps2.xml><?xml version="1.0" encoding="utf-8"?>
-<ds:datastoreItem xmlns:ds="http://schemas.openxmlformats.org/officeDocument/2006/customXml" ds:itemID="{516D10BD-0186-4A00-BD37-17D1BDE22574}">
-  <ds:schemaRefs>
-    <ds:schemaRef ds:uri="http://schemas.microsoft.com/office/2006/metadata/properties"/>
-    <ds:schemaRef ds:uri="http://schemas.microsoft.com/office/infopath/2007/PartnerControls"/>
-  </ds:schemaRefs>
-</ds:datastoreItem>
-</file>
-
 <file path=customXml/itemProps3.xml><?xml version="1.0" encoding="utf-8"?>
 <ds:datastoreItem xmlns:ds="http://schemas.openxmlformats.org/officeDocument/2006/customXml" ds:itemID="{C55A4F12-1C67-45BB-AEF0-B8BD3F656B95}">
   <ds:schemaRefs>

</xml_diff>